<commit_message>
Illustrations for documentation updated for version 0.6.0
</commit_message>
<xml_diff>
--- a/Documentation/Illustrations/file-open-joblist.pptx
+++ b/Documentation/Illustrations/file-open-joblist.pptx
@@ -288,7 +288,7 @@
           <a:p>
             <a:fld id="{B8FB1E64-4CB3-400A-8546-413A16338C43}" type="datetimeFigureOut">
               <a:rPr lang="de-DE" smtClean="0"/>
-              <a:t>16.05.2019</a:t>
+              <a:t>15.08.2019</a:t>
             </a:fld>
             <a:endParaRPr lang="de-DE"/>
           </a:p>
@@ -458,7 +458,7 @@
           <a:p>
             <a:fld id="{B8FB1E64-4CB3-400A-8546-413A16338C43}" type="datetimeFigureOut">
               <a:rPr lang="de-DE" smtClean="0"/>
-              <a:t>16.05.2019</a:t>
+              <a:t>15.08.2019</a:t>
             </a:fld>
             <a:endParaRPr lang="de-DE"/>
           </a:p>
@@ -638,7 +638,7 @@
           <a:p>
             <a:fld id="{B8FB1E64-4CB3-400A-8546-413A16338C43}" type="datetimeFigureOut">
               <a:rPr lang="de-DE" smtClean="0"/>
-              <a:t>16.05.2019</a:t>
+              <a:t>15.08.2019</a:t>
             </a:fld>
             <a:endParaRPr lang="de-DE"/>
           </a:p>
@@ -808,7 +808,7 @@
           <a:p>
             <a:fld id="{B8FB1E64-4CB3-400A-8546-413A16338C43}" type="datetimeFigureOut">
               <a:rPr lang="de-DE" smtClean="0"/>
-              <a:t>16.05.2019</a:t>
+              <a:t>15.08.2019</a:t>
             </a:fld>
             <a:endParaRPr lang="de-DE"/>
           </a:p>
@@ -1054,7 +1054,7 @@
           <a:p>
             <a:fld id="{B8FB1E64-4CB3-400A-8546-413A16338C43}" type="datetimeFigureOut">
               <a:rPr lang="de-DE" smtClean="0"/>
-              <a:t>16.05.2019</a:t>
+              <a:t>15.08.2019</a:t>
             </a:fld>
             <a:endParaRPr lang="de-DE"/>
           </a:p>
@@ -1342,7 +1342,7 @@
           <a:p>
             <a:fld id="{B8FB1E64-4CB3-400A-8546-413A16338C43}" type="datetimeFigureOut">
               <a:rPr lang="de-DE" smtClean="0"/>
-              <a:t>16.05.2019</a:t>
+              <a:t>15.08.2019</a:t>
             </a:fld>
             <a:endParaRPr lang="de-DE"/>
           </a:p>
@@ -1764,7 +1764,7 @@
           <a:p>
             <a:fld id="{B8FB1E64-4CB3-400A-8546-413A16338C43}" type="datetimeFigureOut">
               <a:rPr lang="de-DE" smtClean="0"/>
-              <a:t>16.05.2019</a:t>
+              <a:t>15.08.2019</a:t>
             </a:fld>
             <a:endParaRPr lang="de-DE"/>
           </a:p>
@@ -1882,7 +1882,7 @@
           <a:p>
             <a:fld id="{B8FB1E64-4CB3-400A-8546-413A16338C43}" type="datetimeFigureOut">
               <a:rPr lang="de-DE" smtClean="0"/>
-              <a:t>16.05.2019</a:t>
+              <a:t>15.08.2019</a:t>
             </a:fld>
             <a:endParaRPr lang="de-DE"/>
           </a:p>
@@ -1977,7 +1977,7 @@
           <a:p>
             <a:fld id="{B8FB1E64-4CB3-400A-8546-413A16338C43}" type="datetimeFigureOut">
               <a:rPr lang="de-DE" smtClean="0"/>
-              <a:t>16.05.2019</a:t>
+              <a:t>15.08.2019</a:t>
             </a:fld>
             <a:endParaRPr lang="de-DE"/>
           </a:p>
@@ -2254,7 +2254,7 @@
           <a:p>
             <a:fld id="{B8FB1E64-4CB3-400A-8546-413A16338C43}" type="datetimeFigureOut">
               <a:rPr lang="de-DE" smtClean="0"/>
-              <a:t>16.05.2019</a:t>
+              <a:t>15.08.2019</a:t>
             </a:fld>
             <a:endParaRPr lang="de-DE"/>
           </a:p>
@@ -2507,7 +2507,7 @@
           <a:p>
             <a:fld id="{B8FB1E64-4CB3-400A-8546-413A16338C43}" type="datetimeFigureOut">
               <a:rPr lang="de-DE" smtClean="0"/>
-              <a:t>16.05.2019</a:t>
+              <a:t>15.08.2019</a:t>
             </a:fld>
             <a:endParaRPr lang="de-DE"/>
           </a:p>
@@ -2720,7 +2720,7 @@
           <a:p>
             <a:fld id="{B8FB1E64-4CB3-400A-8546-413A16338C43}" type="datetimeFigureOut">
               <a:rPr lang="de-DE" smtClean="0"/>
-              <a:t>16.05.2019</a:t>
+              <a:t>15.08.2019</a:t>
             </a:fld>
             <a:endParaRPr lang="de-DE"/>
           </a:p>
@@ -3097,7 +3097,7 @@
       </p:grpSpPr>
       <p:pic>
         <p:nvPicPr>
-          <p:cNvPr id="4" name="Grafik 3"/>
+          <p:cNvPr id="2" name="Grafik 1"/>
           <p:cNvPicPr>
             <a:picLocks noChangeAspect="1"/>
           </p:cNvPicPr>
@@ -3117,8 +3117,8 @@
         </p:blipFill>
         <p:spPr>
           <a:xfrm>
-            <a:off x="93300" y="116632"/>
-            <a:ext cx="8964488" cy="6382511"/>
+            <a:off x="0" y="55464"/>
+            <a:ext cx="9144000" cy="6526443"/>
           </a:xfrm>
           <a:prstGeom prst="rect">
             <a:avLst/>
@@ -3133,7 +3133,7 @@
         </p:nvSpPr>
         <p:spPr>
           <a:xfrm>
-            <a:off x="5687616" y="785250"/>
+            <a:off x="5687616" y="775709"/>
             <a:ext cx="155448" cy="1059573"/>
           </a:xfrm>
           <a:prstGeom prst="rightBrace">
@@ -3176,7 +3176,7 @@
         </p:nvSpPr>
         <p:spPr>
           <a:xfrm>
-            <a:off x="5940152" y="1130370"/>
+            <a:off x="5940151" y="1120829"/>
             <a:ext cx="1135247" cy="369332"/>
           </a:xfrm>
           <a:prstGeom prst="rect">
@@ -3214,7 +3214,7 @@
         </p:nvSpPr>
         <p:spPr>
           <a:xfrm>
-            <a:off x="6084168" y="2060849"/>
+            <a:off x="6075183" y="2028126"/>
             <a:ext cx="155448" cy="576064"/>
           </a:xfrm>
           <a:prstGeom prst="rightBrace">
@@ -3257,7 +3257,7 @@
         </p:nvSpPr>
         <p:spPr>
           <a:xfrm>
-            <a:off x="6253680" y="2164215"/>
+            <a:off x="6240503" y="2131492"/>
             <a:ext cx="2771800" cy="369332"/>
           </a:xfrm>
           <a:prstGeom prst="rect">
@@ -3293,11 +3293,7 @@
             </a:r>
             <a:r>
               <a:rPr lang="de-DE" dirty="0" err="1" smtClean="0"/>
-              <a:t>p</a:t>
-            </a:r>
-            <a:r>
-              <a:rPr lang="de-DE" dirty="0" err="1" smtClean="0"/>
-              <a:t>ostprocessing</a:t>
+              <a:t>postprocessing</a:t>
             </a:r>
             <a:endParaRPr lang="de-DE" dirty="0"/>
           </a:p>
@@ -3311,7 +3307,7 @@
         </p:nvCxnSpPr>
         <p:spPr>
           <a:xfrm flipH="1" flipV="1">
-            <a:off x="5004048" y="1988840"/>
+            <a:off x="5049228" y="1984234"/>
             <a:ext cx="1080120" cy="1224137"/>
           </a:xfrm>
           <a:prstGeom prst="straightConnector1">

</xml_diff>